<commit_message>
updating chapter 2 results
</commit_message>
<xml_diff>
--- a/Chapter3.pptx
+++ b/Chapter3.pptx
@@ -211,7 +211,7 @@
           <a:p>
             <a:fld id="{D450EADC-FEA6-49DE-9F56-EBF179A506FA}" type="datetimeFigureOut">
               <a:rPr lang="en-US" smtClean="0"/>
-              <a:t>12/17/2019</a:t>
+              <a:t>12/18/2019</a:t>
             </a:fld>
             <a:endParaRPr lang="en-US"/>
           </a:p>
@@ -544,6 +544,90 @@
           <a:p>
             <a:fld id="{E58BAA1E-6386-428D-9F0B-629A6D459698}" type="slidenum">
               <a:rPr lang="en-US" smtClean="0"/>
+              <a:t>3</a:t>
+            </a:fld>
+            <a:endParaRPr lang="en-US"/>
+          </a:p>
+        </p:txBody>
+      </p:sp>
+    </p:spTree>
+    <p:extLst>
+      <p:ext uri="{BB962C8B-B14F-4D97-AF65-F5344CB8AC3E}">
+        <p14:creationId xmlns:p14="http://schemas.microsoft.com/office/powerpoint/2010/main" val="3521565885"/>
+      </p:ext>
+    </p:extLst>
+  </p:cSld>
+  <p:clrMapOvr>
+    <a:masterClrMapping/>
+  </p:clrMapOvr>
+</p:notes>
+</file>
+
+<file path=ppt/notesSlides/notesSlide2.xml><?xml version="1.0" encoding="utf-8"?>
+<p:notes xmlns:a="http://schemas.openxmlformats.org/drawingml/2006/main" xmlns:r="http://schemas.openxmlformats.org/officeDocument/2006/relationships" xmlns:p="http://schemas.openxmlformats.org/presentationml/2006/main">
+  <p:cSld>
+    <p:spTree>
+      <p:nvGrpSpPr>
+        <p:cNvPr id="1" name=""/>
+        <p:cNvGrpSpPr/>
+        <p:nvPr/>
+      </p:nvGrpSpPr>
+      <p:grpSpPr>
+        <a:xfrm>
+          <a:off x="0" y="0"/>
+          <a:ext cx="0" cy="0"/>
+          <a:chOff x="0" y="0"/>
+          <a:chExt cx="0" cy="0"/>
+        </a:xfrm>
+      </p:grpSpPr>
+      <p:sp>
+        <p:nvSpPr>
+          <p:cNvPr id="2" name="Slide Image Placeholder 1"/>
+          <p:cNvSpPr>
+            <a:spLocks noGrp="1" noRot="1" noChangeAspect="1"/>
+          </p:cNvSpPr>
+          <p:nvPr>
+            <p:ph type="sldImg"/>
+          </p:nvPr>
+        </p:nvSpPr>
+        <p:spPr/>
+      </p:sp>
+      <p:sp>
+        <p:nvSpPr>
+          <p:cNvPr id="3" name="Notes Placeholder 2"/>
+          <p:cNvSpPr>
+            <a:spLocks noGrp="1"/>
+          </p:cNvSpPr>
+          <p:nvPr>
+            <p:ph type="body" idx="1"/>
+          </p:nvPr>
+        </p:nvSpPr>
+        <p:spPr/>
+        <p:txBody>
+          <a:bodyPr/>
+          <a:lstStyle/>
+          <a:p>
+            <a:endParaRPr lang="en-US"/>
+          </a:p>
+        </p:txBody>
+      </p:sp>
+      <p:sp>
+        <p:nvSpPr>
+          <p:cNvPr id="4" name="Slide Number Placeholder 3"/>
+          <p:cNvSpPr>
+            <a:spLocks noGrp="1"/>
+          </p:cNvSpPr>
+          <p:nvPr>
+            <p:ph type="sldNum" sz="quarter" idx="10"/>
+          </p:nvPr>
+        </p:nvSpPr>
+        <p:spPr/>
+        <p:txBody>
+          <a:bodyPr/>
+          <a:lstStyle/>
+          <a:p>
+            <a:fld id="{E58BAA1E-6386-428D-9F0B-629A6D459698}" type="slidenum">
+              <a:rPr lang="en-US" smtClean="0"/>
               <a:t>10</a:t>
             </a:fld>
             <a:endParaRPr lang="en-US"/>
@@ -563,7 +647,7 @@
 </p:notes>
 </file>
 
-<file path=ppt/notesSlides/notesSlide2.xml><?xml version="1.0" encoding="utf-8"?>
+<file path=ppt/notesSlides/notesSlide3.xml><?xml version="1.0" encoding="utf-8"?>
 <p:notes xmlns:a="http://schemas.openxmlformats.org/drawingml/2006/main" xmlns:r="http://schemas.openxmlformats.org/officeDocument/2006/relationships" xmlns:p="http://schemas.openxmlformats.org/presentationml/2006/main">
   <p:cSld>
     <p:spTree>
@@ -817,7 +901,7 @@
           <a:p>
             <a:fld id="{EE4AA1F5-36B3-47C0-A09D-6553A0694461}" type="datetimeFigureOut">
               <a:rPr lang="en-US" smtClean="0"/>
-              <a:t>12/17/2019</a:t>
+              <a:t>12/18/2019</a:t>
             </a:fld>
             <a:endParaRPr lang="en-US"/>
           </a:p>
@@ -987,7 +1071,7 @@
           <a:p>
             <a:fld id="{EE4AA1F5-36B3-47C0-A09D-6553A0694461}" type="datetimeFigureOut">
               <a:rPr lang="en-US" smtClean="0"/>
-              <a:t>12/17/2019</a:t>
+              <a:t>12/18/2019</a:t>
             </a:fld>
             <a:endParaRPr lang="en-US"/>
           </a:p>
@@ -1167,7 +1251,7 @@
           <a:p>
             <a:fld id="{EE4AA1F5-36B3-47C0-A09D-6553A0694461}" type="datetimeFigureOut">
               <a:rPr lang="en-US" smtClean="0"/>
-              <a:t>12/17/2019</a:t>
+              <a:t>12/18/2019</a:t>
             </a:fld>
             <a:endParaRPr lang="en-US"/>
           </a:p>
@@ -1337,7 +1421,7 @@
           <a:p>
             <a:fld id="{EE4AA1F5-36B3-47C0-A09D-6553A0694461}" type="datetimeFigureOut">
               <a:rPr lang="en-US" smtClean="0"/>
-              <a:t>12/17/2019</a:t>
+              <a:t>12/18/2019</a:t>
             </a:fld>
             <a:endParaRPr lang="en-US"/>
           </a:p>
@@ -1583,7 +1667,7 @@
           <a:p>
             <a:fld id="{EE4AA1F5-36B3-47C0-A09D-6553A0694461}" type="datetimeFigureOut">
               <a:rPr lang="en-US" smtClean="0"/>
-              <a:t>12/17/2019</a:t>
+              <a:t>12/18/2019</a:t>
             </a:fld>
             <a:endParaRPr lang="en-US"/>
           </a:p>
@@ -1815,7 +1899,7 @@
           <a:p>
             <a:fld id="{EE4AA1F5-36B3-47C0-A09D-6553A0694461}" type="datetimeFigureOut">
               <a:rPr lang="en-US" smtClean="0"/>
-              <a:t>12/17/2019</a:t>
+              <a:t>12/18/2019</a:t>
             </a:fld>
             <a:endParaRPr lang="en-US"/>
           </a:p>
@@ -2182,7 +2266,7 @@
           <a:p>
             <a:fld id="{EE4AA1F5-36B3-47C0-A09D-6553A0694461}" type="datetimeFigureOut">
               <a:rPr lang="en-US" smtClean="0"/>
-              <a:t>12/17/2019</a:t>
+              <a:t>12/18/2019</a:t>
             </a:fld>
             <a:endParaRPr lang="en-US"/>
           </a:p>
@@ -2300,7 +2384,7 @@
           <a:p>
             <a:fld id="{EE4AA1F5-36B3-47C0-A09D-6553A0694461}" type="datetimeFigureOut">
               <a:rPr lang="en-US" smtClean="0"/>
-              <a:t>12/17/2019</a:t>
+              <a:t>12/18/2019</a:t>
             </a:fld>
             <a:endParaRPr lang="en-US"/>
           </a:p>
@@ -2395,7 +2479,7 @@
           <a:p>
             <a:fld id="{EE4AA1F5-36B3-47C0-A09D-6553A0694461}" type="datetimeFigureOut">
               <a:rPr lang="en-US" smtClean="0"/>
-              <a:t>12/17/2019</a:t>
+              <a:t>12/18/2019</a:t>
             </a:fld>
             <a:endParaRPr lang="en-US"/>
           </a:p>
@@ -2672,7 +2756,7 @@
           <a:p>
             <a:fld id="{EE4AA1F5-36B3-47C0-A09D-6553A0694461}" type="datetimeFigureOut">
               <a:rPr lang="en-US" smtClean="0"/>
-              <a:t>12/17/2019</a:t>
+              <a:t>12/18/2019</a:t>
             </a:fld>
             <a:endParaRPr lang="en-US"/>
           </a:p>
@@ -2925,7 +3009,7 @@
           <a:p>
             <a:fld id="{EE4AA1F5-36B3-47C0-A09D-6553A0694461}" type="datetimeFigureOut">
               <a:rPr lang="en-US" smtClean="0"/>
-              <a:t>12/17/2019</a:t>
+              <a:t>12/18/2019</a:t>
             </a:fld>
             <a:endParaRPr lang="en-US"/>
           </a:p>
@@ -3138,7 +3222,7 @@
           <a:p>
             <a:fld id="{EE4AA1F5-36B3-47C0-A09D-6553A0694461}" type="datetimeFigureOut">
               <a:rPr lang="en-US" smtClean="0"/>
-              <a:t>12/17/2019</a:t>
+              <a:t>12/18/2019</a:t>
             </a:fld>
             <a:endParaRPr lang="en-US"/>
           </a:p>

</xml_diff>